<commit_message>
Update slides and images
</commit_message>
<xml_diff>
--- a/Report/Presentation_slidesAlex.pptx
+++ b/Report/Presentation_slidesAlex.pptx
@@ -3350,8 +3350,8 @@
           </a:p>
         </p:txBody>
       </p:sp>
-      <mc:AlternateContent xmlns:mc="http://schemas.openxmlformats.org/markup-compatibility/2006">
-        <mc:Choice xmlns:a14="http://schemas.microsoft.com/office/drawing/2010/main" Requires="a14">
+      <mc:AlternateContent xmlns:mc="http://schemas.openxmlformats.org/markup-compatibility/2006" xmlns:a14="http://schemas.microsoft.com/office/drawing/2010/main">
+        <mc:Choice Requires="a14">
           <p:sp>
             <p:nvSpPr>
               <p:cNvPr id="3" name="Content Placeholder 2"/>
@@ -3604,11 +3604,7 @@
                 </a:r>
                 <a:r>
                   <a:rPr lang="en-US" dirty="0" smtClean="0"/>
-                  <a:t> </a:t>
-                </a:r>
-                <a:r>
-                  <a:rPr lang="en-US" dirty="0" smtClean="0"/>
-                  <a:t>operator is preserved under isometry</a:t>
+                  <a:t> operator is preserved under isometry</a:t>
                 </a:r>
                 <a:endParaRPr lang="en-US" dirty="0"/>
               </a:p>
@@ -3764,12 +3760,11 @@
                   <a:rPr lang="en-US" dirty="0" smtClean="0"/>
                   <a:t>Can be rewritten as linear constraints </a:t>
                 </a:r>
-                <a:endParaRPr lang="en-US" dirty="0" smtClean="0"/>
               </a:p>
             </p:txBody>
           </p:sp>
         </mc:Choice>
-        <mc:Fallback>
+        <mc:Fallback xmlns="">
           <p:sp>
             <p:nvSpPr>
               <p:cNvPr id="3" name="Content Placeholder 2"/>
@@ -3867,25 +3862,379 @@
           </a:p>
         </p:txBody>
       </p:sp>
-      <p:sp>
-        <p:nvSpPr>
-          <p:cNvPr id="3" name="Content Placeholder 2"/>
-          <p:cNvSpPr>
-            <a:spLocks noGrp="1"/>
-          </p:cNvSpPr>
-          <p:nvPr>
-            <p:ph idx="1"/>
-          </p:nvPr>
-        </p:nvSpPr>
-        <p:spPr/>
-        <p:txBody>
-          <a:bodyPr/>
-          <a:lstStyle/>
-          <a:p>
-            <a:endParaRPr lang="fr-FR" dirty="0"/>
-          </a:p>
-        </p:txBody>
-      </p:sp>
+      <mc:AlternateContent xmlns:mc="http://schemas.openxmlformats.org/markup-compatibility/2006">
+        <mc:Choice xmlns:a14="http://schemas.microsoft.com/office/drawing/2010/main" Requires="a14">
+          <p:sp>
+            <p:nvSpPr>
+              <p:cNvPr id="3" name="Content Placeholder 2"/>
+              <p:cNvSpPr>
+                <a:spLocks noGrp="1"/>
+              </p:cNvSpPr>
+              <p:nvPr>
+                <p:ph idx="1"/>
+              </p:nvPr>
+            </p:nvSpPr>
+            <p:spPr/>
+            <p:txBody>
+              <a:bodyPr/>
+              <a:lstStyle/>
+              <a:p>
+                <a:r>
+                  <a:rPr lang="fr-FR" dirty="0" smtClean="0"/>
+                  <a:t>Refinement : </a:t>
+                </a:r>
+                <a:r>
+                  <a:rPr lang="fr-FR" dirty="0" err="1" smtClean="0"/>
+                  <a:t>Iterative</a:t>
+                </a:r>
+                <a:r>
+                  <a:rPr lang="fr-FR" dirty="0" smtClean="0"/>
+                  <a:t> closes point </a:t>
+                </a:r>
+                <a:r>
+                  <a:rPr lang="fr-FR" dirty="0" err="1" smtClean="0"/>
+                  <a:t>algorithm</a:t>
+                </a:r>
+                <a:r>
+                  <a:rPr lang="fr-FR" dirty="0" smtClean="0"/>
+                  <a:t> on the </a:t>
+                </a:r>
+                <a:r>
+                  <a:rPr lang="fr-FR" dirty="0" err="1" smtClean="0"/>
+                  <a:t>function</a:t>
+                </a:r>
+                <a:r>
+                  <a:rPr lang="fr-FR" dirty="0" smtClean="0"/>
+                  <a:t> </a:t>
+                </a:r>
+                <a:r>
+                  <a:rPr lang="fr-FR" dirty="0" err="1" smtClean="0"/>
+                  <a:t>space</a:t>
+                </a:r>
+                <a:endParaRPr lang="fr-FR" dirty="0" smtClean="0"/>
+              </a:p>
+              <a:p>
+                <a:pPr lvl="1"/>
+                <a:r>
+                  <a:rPr lang="fr-FR" dirty="0" err="1" smtClean="0"/>
+                  <a:t>Find</a:t>
+                </a:r>
+                <a:r>
+                  <a:rPr lang="fr-FR" dirty="0" smtClean="0"/>
+                  <a:t> </a:t>
+                </a:r>
+                <a:r>
+                  <a:rPr lang="fr-FR" dirty="0" err="1" smtClean="0"/>
+                  <a:t>correspondences</a:t>
+                </a:r>
+                <a:r>
+                  <a:rPr lang="fr-FR" dirty="0" smtClean="0"/>
+                  <a:t> </a:t>
+                </a:r>
+                <a:r>
+                  <a:rPr lang="fr-FR" dirty="0" err="1" smtClean="0"/>
+                  <a:t>between</a:t>
+                </a:r>
+                <a:r>
+                  <a:rPr lang="fr-FR" dirty="0" smtClean="0"/>
+                  <a:t> points </a:t>
+                </a:r>
+                <a:r>
+                  <a:rPr lang="fr-FR" dirty="0" err="1" smtClean="0"/>
+                  <a:t>using</a:t>
+                </a:r>
+                <a:r>
+                  <a:rPr lang="fr-FR" dirty="0" smtClean="0"/>
+                  <a:t> a good approximation of C</a:t>
+                </a:r>
+              </a:p>
+              <a:p>
+                <a:pPr lvl="1"/>
+                <a:r>
+                  <a:rPr lang="fr-FR" dirty="0" err="1" smtClean="0"/>
+                  <a:t>Find</a:t>
+                </a:r>
+                <a:r>
+                  <a:rPr lang="fr-FR" dirty="0" smtClean="0"/>
+                  <a:t> the best </a:t>
+                </a:r>
+                <a:r>
+                  <a:rPr lang="fr-FR" dirty="0" err="1" smtClean="0"/>
+                  <a:t>aligment</a:t>
+                </a:r>
+                <a:r>
+                  <a:rPr lang="fr-FR" dirty="0" smtClean="0"/>
+                  <a:t> for the </a:t>
+                </a:r>
+                <a:r>
+                  <a:rPr lang="fr-FR" dirty="0" err="1" smtClean="0"/>
+                  <a:t>corresponding</a:t>
+                </a:r>
+                <a:r>
+                  <a:rPr lang="fr-FR" dirty="0" smtClean="0"/>
+                  <a:t> points</a:t>
+                </a:r>
+              </a:p>
+              <a:p>
+                <a:pPr lvl="1"/>
+                <a:r>
+                  <a:rPr lang="fr-FR" dirty="0" smtClean="0"/>
+                  <a:t>Update matrix C and </a:t>
+                </a:r>
+                <a:r>
+                  <a:rPr lang="fr-FR" dirty="0" err="1" smtClean="0"/>
+                  <a:t>iterate</a:t>
+                </a:r>
+                <a:r>
+                  <a:rPr lang="fr-FR" dirty="0" smtClean="0"/>
+                  <a:t> </a:t>
+                </a:r>
+                <a:r>
+                  <a:rPr lang="fr-FR" dirty="0" err="1" smtClean="0"/>
+                  <a:t>until</a:t>
+                </a:r>
+                <a:r>
+                  <a:rPr lang="fr-FR" dirty="0" smtClean="0"/>
+                  <a:t> acceptable </a:t>
+                </a:r>
+                <a:r>
+                  <a:rPr lang="fr-FR" dirty="0" err="1" smtClean="0"/>
+                  <a:t>results</a:t>
+                </a:r>
+                <a:endParaRPr lang="fr-FR" dirty="0" smtClean="0"/>
+              </a:p>
+              <a:p>
+                <a:r>
+                  <a:rPr lang="fr-FR" dirty="0" smtClean="0"/>
+                  <a:t>Conversion point to point :</a:t>
+                </a:r>
+              </a:p>
+              <a:p>
+                <a:pPr lvl="1"/>
+                <a:r>
+                  <a:rPr lang="fr-FR" dirty="0" err="1" smtClean="0"/>
+                  <a:t>Build</a:t>
+                </a:r>
+                <a:r>
+                  <a:rPr lang="fr-FR" dirty="0" smtClean="0"/>
+                  <a:t> </a:t>
+                </a:r>
+                <a:r>
+                  <a:rPr lang="fr-FR" dirty="0" err="1" smtClean="0"/>
+                  <a:t>indicator</a:t>
+                </a:r>
+                <a:r>
+                  <a:rPr lang="fr-FR" dirty="0" smtClean="0"/>
+                  <a:t> </a:t>
+                </a:r>
+                <a:r>
+                  <a:rPr lang="fr-FR" dirty="0" err="1" smtClean="0"/>
+                  <a:t>function</a:t>
+                </a:r>
+                <a:r>
+                  <a:rPr lang="fr-FR" dirty="0" smtClean="0"/>
+                  <a:t> for </a:t>
+                </a:r>
+                <a:r>
+                  <a:rPr lang="fr-FR" dirty="0" err="1" smtClean="0"/>
+                  <a:t>each</a:t>
+                </a:r>
+                <a:r>
+                  <a:rPr lang="fr-FR" dirty="0" smtClean="0"/>
+                  <a:t> vertex, </a:t>
+                </a:r>
+                <a:r>
+                  <a:rPr lang="fr-FR" dirty="0" err="1" smtClean="0"/>
+                  <a:t>map</a:t>
+                </a:r>
+                <a:r>
+                  <a:rPr lang="fr-FR" dirty="0" smtClean="0"/>
+                  <a:t> the </a:t>
+                </a:r>
+                <a:r>
+                  <a:rPr lang="fr-FR" dirty="0" err="1" smtClean="0"/>
+                  <a:t>function</a:t>
+                </a:r>
+                <a:r>
+                  <a:rPr lang="fr-FR" dirty="0" smtClean="0"/>
+                  <a:t> and </a:t>
+                </a:r>
+                <a:r>
+                  <a:rPr lang="fr-FR" dirty="0" err="1" smtClean="0"/>
+                  <a:t>find</a:t>
+                </a:r>
+                <a:r>
+                  <a:rPr lang="fr-FR" dirty="0" smtClean="0"/>
+                  <a:t> the maximum </a:t>
+                </a:r>
+              </a:p>
+              <a:p>
+                <a:pPr lvl="1"/>
+                <a:r>
+                  <a:rPr lang="fr-FR" dirty="0" smtClean="0"/>
+                  <a:t>Or use </a:t>
+                </a:r>
+                <a:r>
+                  <a:rPr lang="fr-FR" dirty="0" err="1" smtClean="0"/>
+                  <a:t>find</a:t>
+                </a:r>
+                <a:r>
+                  <a:rPr lang="fr-FR" dirty="0" smtClean="0"/>
+                  <a:t> the </a:t>
+                </a:r>
+                <a:r>
+                  <a:rPr lang="fr-FR" dirty="0" err="1" smtClean="0"/>
+                  <a:t>nearest</a:t>
+                </a:r>
+                <a:r>
+                  <a:rPr lang="fr-FR" dirty="0" smtClean="0"/>
+                  <a:t> </a:t>
+                </a:r>
+                <a:r>
+                  <a:rPr lang="fr-FR" dirty="0" err="1" smtClean="0"/>
+                  <a:t>neighbour</a:t>
+                </a:r>
+                <a:r>
+                  <a:rPr lang="fr-FR" dirty="0" smtClean="0"/>
+                  <a:t> of </a:t>
+                </a:r>
+                <a14:m>
+                  <m:oMath xmlns:m="http://schemas.openxmlformats.org/officeDocument/2006/math">
+                    <m:r>
+                      <a:rPr lang="fr-FR" b="0" i="1" smtClean="0">
+                        <a:latin typeface="Cambria Math" panose="02040503050406030204" pitchFamily="18" charset="0"/>
+                      </a:rPr>
+                      <m:t>𝐶</m:t>
+                    </m:r>
+                    <m:sSup>
+                      <m:sSupPr>
+                        <m:ctrlPr>
+                          <a:rPr lang="fr-FR" b="0" i="1" smtClean="0">
+                            <a:latin typeface="Cambria Math" panose="02040503050406030204" pitchFamily="18" charset="0"/>
+                          </a:rPr>
+                        </m:ctrlPr>
+                      </m:sSupPr>
+                      <m:e>
+                        <m:r>
+                          <a:rPr lang="fr-FR" b="0" i="1" smtClean="0">
+                            <a:latin typeface="Cambria Math" panose="02040503050406030204" pitchFamily="18" charset="0"/>
+                            <a:ea typeface="Cambria Math" panose="02040503050406030204" pitchFamily="18" charset="0"/>
+                          </a:rPr>
+                          <m:t>𝜙</m:t>
+                        </m:r>
+                      </m:e>
+                      <m:sup>
+                        <m:r>
+                          <a:rPr lang="fr-FR" b="0" i="1" smtClean="0">
+                            <a:latin typeface="Cambria Math" panose="02040503050406030204" pitchFamily="18" charset="0"/>
+                          </a:rPr>
+                          <m:t>𝑀</m:t>
+                        </m:r>
+                      </m:sup>
+                    </m:sSup>
+                  </m:oMath>
+                </a14:m>
+                <a:r>
+                  <a:rPr lang="fr-FR" dirty="0" smtClean="0"/>
+                  <a:t> in </a:t>
+                </a:r>
+                <a14:m>
+                  <m:oMath xmlns:m="http://schemas.openxmlformats.org/officeDocument/2006/math">
+                    <m:sSup>
+                      <m:sSupPr>
+                        <m:ctrlPr>
+                          <a:rPr lang="fr-FR" i="1" smtClean="0">
+                            <a:latin typeface="Cambria Math" panose="02040503050406030204" pitchFamily="18" charset="0"/>
+                          </a:rPr>
+                        </m:ctrlPr>
+                      </m:sSupPr>
+                      <m:e>
+                        <m:r>
+                          <a:rPr lang="fr-FR" i="1" smtClean="0">
+                            <a:latin typeface="Cambria Math" panose="02040503050406030204" pitchFamily="18" charset="0"/>
+                            <a:ea typeface="Cambria Math" panose="02040503050406030204" pitchFamily="18" charset="0"/>
+                          </a:rPr>
+                          <m:t>𝜙</m:t>
+                        </m:r>
+                      </m:e>
+                      <m:sup>
+                        <m:r>
+                          <a:rPr lang="fr-FR" b="0" i="1" smtClean="0">
+                            <a:latin typeface="Cambria Math" panose="02040503050406030204" pitchFamily="18" charset="0"/>
+                          </a:rPr>
+                          <m:t>𝑁</m:t>
+                        </m:r>
+                      </m:sup>
+                    </m:sSup>
+                  </m:oMath>
+                </a14:m>
+                <a:r>
+                  <a:rPr lang="fr-FR" dirty="0" smtClean="0"/>
+                  <a:t> </a:t>
+                </a:r>
+                <a:r>
+                  <a:rPr lang="fr-FR" dirty="0" err="1" smtClean="0"/>
+                  <a:t>using</a:t>
+                </a:r>
+                <a:r>
+                  <a:rPr lang="fr-FR" dirty="0" smtClean="0"/>
+                  <a:t> an efficient </a:t>
+                </a:r>
+                <a:r>
+                  <a:rPr lang="fr-FR" dirty="0" err="1" smtClean="0"/>
+                  <a:t>search</a:t>
+                </a:r>
+                <a:r>
+                  <a:rPr lang="fr-FR" dirty="0" smtClean="0"/>
+                  <a:t> structure (</a:t>
+                </a:r>
+                <a:r>
+                  <a:rPr lang="fr-FR" dirty="0" err="1" smtClean="0"/>
+                  <a:t>kd-tree</a:t>
+                </a:r>
+                <a:r>
+                  <a:rPr lang="fr-FR" smtClean="0"/>
+                  <a:t>)</a:t>
+                </a:r>
+                <a:endParaRPr lang="fr-FR" dirty="0"/>
+              </a:p>
+            </p:txBody>
+          </p:sp>
+        </mc:Choice>
+        <mc:Fallback>
+          <p:sp>
+            <p:nvSpPr>
+              <p:cNvPr id="3" name="Content Placeholder 2"/>
+              <p:cNvSpPr>
+                <a:spLocks noGrp="1" noRot="1" noChangeAspect="1" noMove="1" noResize="1" noEditPoints="1" noAdjustHandles="1" noChangeArrowheads="1" noChangeShapeType="1" noTextEdit="1"/>
+              </p:cNvSpPr>
+              <p:nvPr>
+                <p:ph idx="1"/>
+              </p:nvPr>
+            </p:nvSpPr>
+            <p:spPr>
+              <a:blipFill rotWithShape="0">
+                <a:blip r:embed="rId2"/>
+                <a:stretch>
+                  <a:fillRect l="-1043" t="-2241"/>
+                </a:stretch>
+              </a:blipFill>
+            </p:spPr>
+            <p:txBody>
+              <a:bodyPr/>
+              <a:lstStyle/>
+              <a:p>
+                <a:r>
+                  <a:rPr lang="fr-FR">
+                    <a:noFill/>
+                  </a:rPr>
+                  <a:t> </a:t>
+                </a:r>
+              </a:p>
+            </p:txBody>
+          </p:sp>
+        </mc:Fallback>
+      </mc:AlternateContent>
     </p:spTree>
     <p:extLst>
       <p:ext uri="{BB962C8B-B14F-4D97-AF65-F5344CB8AC3E}">
@@ -4036,13 +4385,8 @@
             </a:r>
             <a:r>
               <a:rPr lang="fr-FR" dirty="0" smtClean="0"/>
-              <a:t> </a:t>
-            </a:r>
-            <a:r>
-              <a:rPr lang="fr-FR" dirty="0" smtClean="0"/>
-              <a:t>LB</a:t>
-            </a:r>
-            <a:endParaRPr lang="fr-FR" dirty="0" smtClean="0"/>
+              <a:t> LB</a:t>
+            </a:r>
           </a:p>
           <a:p>
             <a:r>
@@ -4081,17 +4425,8 @@
             </a:r>
             <a:r>
               <a:rPr lang="fr-FR" dirty="0" smtClean="0"/>
-              <a:t> </a:t>
-            </a:r>
-            <a:r>
-              <a:rPr lang="fr-FR" dirty="0" smtClean="0"/>
-              <a:t>(ICP</a:t>
-            </a:r>
-            <a:r>
-              <a:rPr lang="fr-FR" dirty="0" smtClean="0"/>
-              <a:t>))</a:t>
-            </a:r>
-            <a:endParaRPr lang="fr-FR" dirty="0" smtClean="0"/>
+              <a:t> (ICP))</a:t>
+            </a:r>
           </a:p>
           <a:p>
             <a:r>
@@ -4157,12 +4492,28 @@
           <a:lstStyle/>
           <a:p>
             <a:r>
+              <a:rPr lang="fr-FR" dirty="0" err="1" smtClean="0"/>
+              <a:t>Preliminary</a:t>
+            </a:r>
+            <a:r>
               <a:rPr lang="fr-FR" dirty="0" smtClean="0"/>
-              <a:t>Résultats </a:t>
+              <a:t> </a:t>
+            </a:r>
+            <a:r>
+              <a:rPr lang="fr-FR" dirty="0" err="1" smtClean="0"/>
+              <a:t>results</a:t>
             </a:r>
             <a:r>
               <a:rPr lang="fr-FR" dirty="0" smtClean="0"/>
-              <a:t>préliminaires – Descripteurs - Alex</a:t>
+              <a:t> – Computation of </a:t>
+            </a:r>
+            <a:r>
+              <a:rPr lang="fr-FR" dirty="0" err="1" smtClean="0"/>
+              <a:t>map</a:t>
+            </a:r>
+            <a:r>
+              <a:rPr lang="fr-FR" dirty="0" smtClean="0"/>
+              <a:t> C</a:t>
             </a:r>
             <a:endParaRPr lang="fr-FR" dirty="0"/>
           </a:p>
@@ -4170,7 +4521,7 @@
       </p:sp>
       <p:pic>
         <p:nvPicPr>
-          <p:cNvPr id="12" name="Picture 11"/>
+          <p:cNvPr id="3" name="Picture 2"/>
           <p:cNvPicPr>
             <a:picLocks noChangeAspect="1"/>
           </p:cNvPicPr>
@@ -4190,8 +4541,8 @@
         </p:blipFill>
         <p:spPr>
           <a:xfrm>
-            <a:off x="132731" y="1690688"/>
-            <a:ext cx="5342857" cy="4000000"/>
+            <a:off x="838200" y="1690688"/>
+            <a:ext cx="2861929" cy="2142621"/>
           </a:xfrm>
           <a:prstGeom prst="rect">
             <a:avLst/>
@@ -4200,13 +4551,13 @@
       </p:pic>
       <p:pic>
         <p:nvPicPr>
-          <p:cNvPr id="13" name="Picture 12"/>
+          <p:cNvPr id="4" name="Picture 3"/>
           <p:cNvPicPr>
             <a:picLocks noChangeAspect="1"/>
           </p:cNvPicPr>
           <p:nvPr/>
         </p:nvPicPr>
-        <p:blipFill rotWithShape="1">
+        <p:blipFill>
           <a:blip r:embed="rId3">
             <a:extLst>
               <a:ext uri="{28A0092B-C50C-407E-A947-70E740481C1C}">
@@ -4214,22 +4565,203 @@
               </a:ext>
             </a:extLst>
           </a:blip>
-          <a:srcRect t="8189" b="12124"/>
-          <a:stretch/>
+          <a:stretch>
+            <a:fillRect/>
+          </a:stretch>
         </p:blipFill>
         <p:spPr>
           <a:xfrm>
-            <a:off x="6452613" y="1349131"/>
-            <a:ext cx="4327714" cy="2581837"/>
+            <a:off x="838200" y="3833309"/>
+            <a:ext cx="2861929" cy="2142621"/>
           </a:xfrm>
           <a:prstGeom prst="rect">
             <a:avLst/>
           </a:prstGeom>
         </p:spPr>
       </p:pic>
+      <p:sp>
+        <p:nvSpPr>
+          <p:cNvPr id="6" name="TextBox 5"/>
+          <p:cNvSpPr txBox="1"/>
+          <p:nvPr/>
+        </p:nvSpPr>
+        <p:spPr>
+          <a:xfrm>
+            <a:off x="3700129" y="3235182"/>
+            <a:ext cx="4440383" cy="1754326"/>
+          </a:xfrm>
+          <a:prstGeom prst="rect">
+            <a:avLst/>
+          </a:prstGeom>
+          <a:noFill/>
+        </p:spPr>
+        <p:txBody>
+          <a:bodyPr wrap="none" rtlCol="0">
+            <a:spAutoFit/>
+          </a:bodyPr>
+          <a:lstStyle/>
+          <a:p>
+            <a:r>
+              <a:rPr lang="fr-FR" dirty="0" err="1" smtClean="0"/>
+              <a:t>Map</a:t>
+            </a:r>
+            <a:r>
+              <a:rPr lang="fr-FR" dirty="0" smtClean="0"/>
+              <a:t> </a:t>
+            </a:r>
+            <a:r>
+              <a:rPr lang="fr-FR" dirty="0" err="1" smtClean="0"/>
+              <a:t>computed</a:t>
+            </a:r>
+            <a:r>
+              <a:rPr lang="fr-FR" dirty="0" smtClean="0"/>
+              <a:t> </a:t>
+            </a:r>
+            <a:r>
+              <a:rPr lang="fr-FR" dirty="0" err="1" smtClean="0"/>
+              <a:t>with</a:t>
+            </a:r>
+            <a:r>
+              <a:rPr lang="fr-FR" dirty="0" smtClean="0"/>
+              <a:t> 40 </a:t>
+            </a:r>
+            <a:r>
+              <a:rPr lang="fr-FR" dirty="0" err="1" smtClean="0"/>
+              <a:t>eigenfunctions</a:t>
+            </a:r>
+            <a:r>
+              <a:rPr lang="fr-FR" dirty="0" smtClean="0"/>
+              <a:t> </a:t>
+            </a:r>
+            <a:r>
+              <a:rPr lang="fr-FR" dirty="0" err="1" smtClean="0"/>
+              <a:t>with</a:t>
+            </a:r>
+            <a:endParaRPr lang="fr-FR" dirty="0" smtClean="0"/>
+          </a:p>
+          <a:p>
+            <a:pPr marL="285750" indent="-285750">
+              <a:buFont typeface="Arial" panose="020B0604020202020204" pitchFamily="34" charset="0"/>
+              <a:buChar char="•"/>
+            </a:pPr>
+            <a:r>
+              <a:rPr lang="fr-FR" dirty="0" smtClean="0"/>
+              <a:t>HKS </a:t>
+            </a:r>
+            <a:r>
+              <a:rPr lang="fr-FR" dirty="0" err="1" smtClean="0"/>
+              <a:t>preservation</a:t>
+            </a:r>
+            <a:r>
+              <a:rPr lang="fr-FR" dirty="0" smtClean="0"/>
+              <a:t> </a:t>
+            </a:r>
+            <a:r>
+              <a:rPr lang="fr-FR" dirty="0" err="1" smtClean="0"/>
+              <a:t>constraints</a:t>
+            </a:r>
+            <a:endParaRPr lang="fr-FR" dirty="0" smtClean="0"/>
+          </a:p>
+          <a:p>
+            <a:pPr marL="285750" indent="-285750">
+              <a:buFont typeface="Arial" panose="020B0604020202020204" pitchFamily="34" charset="0"/>
+              <a:buChar char="•"/>
+            </a:pPr>
+            <a:r>
+              <a:rPr lang="fr-FR" dirty="0" smtClean="0"/>
+              <a:t>WKS </a:t>
+            </a:r>
+            <a:r>
+              <a:rPr lang="fr-FR" dirty="0" err="1" smtClean="0"/>
+              <a:t>preservation</a:t>
+            </a:r>
+            <a:r>
+              <a:rPr lang="fr-FR" dirty="0" smtClean="0"/>
+              <a:t> </a:t>
+            </a:r>
+            <a:r>
+              <a:rPr lang="fr-FR" dirty="0" err="1" smtClean="0"/>
+              <a:t>constraints</a:t>
+            </a:r>
+            <a:endParaRPr lang="fr-FR" dirty="0" smtClean="0"/>
+          </a:p>
+          <a:p>
+            <a:pPr marL="285750" indent="-285750">
+              <a:buFont typeface="Arial" panose="020B0604020202020204" pitchFamily="34" charset="0"/>
+              <a:buChar char="•"/>
+            </a:pPr>
+            <a:r>
+              <a:rPr lang="fr-FR" dirty="0"/>
+              <a:t>One segment </a:t>
+            </a:r>
+            <a:r>
+              <a:rPr lang="fr-FR" dirty="0" err="1"/>
+              <a:t>preservation</a:t>
+            </a:r>
+            <a:r>
+              <a:rPr lang="fr-FR" dirty="0"/>
+              <a:t> </a:t>
+            </a:r>
+            <a:r>
+              <a:rPr lang="fr-FR" dirty="0" err="1" smtClean="0"/>
+              <a:t>constraint</a:t>
+            </a:r>
+            <a:r>
+              <a:rPr lang="fr-FR" dirty="0" smtClean="0"/>
+              <a:t> (</a:t>
+            </a:r>
+            <a:r>
+              <a:rPr lang="fr-FR" dirty="0" err="1" smtClean="0"/>
+              <a:t>tail</a:t>
+            </a:r>
+            <a:r>
+              <a:rPr lang="fr-FR" dirty="0" smtClean="0"/>
+              <a:t>)</a:t>
+            </a:r>
+          </a:p>
+          <a:p>
+            <a:pPr marL="285750" indent="-285750">
+              <a:buFont typeface="Arial" panose="020B0604020202020204" pitchFamily="34" charset="0"/>
+              <a:buChar char="•"/>
+            </a:pPr>
+            <a:r>
+              <a:rPr lang="fr-FR" dirty="0" smtClean="0"/>
+              <a:t>LB </a:t>
+            </a:r>
+            <a:r>
+              <a:rPr lang="fr-FR" dirty="0" err="1" smtClean="0"/>
+              <a:t>operator</a:t>
+            </a:r>
+            <a:r>
+              <a:rPr lang="fr-FR" dirty="0" smtClean="0"/>
+              <a:t> </a:t>
+            </a:r>
+            <a:r>
+              <a:rPr lang="fr-FR" dirty="0" err="1" smtClean="0"/>
+              <a:t>commutativity</a:t>
+            </a:r>
+            <a:r>
+              <a:rPr lang="fr-FR" dirty="0" smtClean="0"/>
+              <a:t> </a:t>
+            </a:r>
+            <a:r>
+              <a:rPr lang="fr-FR" dirty="0" err="1" smtClean="0"/>
+              <a:t>constraints</a:t>
+            </a:r>
+            <a:endParaRPr lang="fr-FR" dirty="0" smtClean="0"/>
+          </a:p>
+          <a:p>
+            <a:pPr marL="285750" indent="-285750">
+              <a:buFont typeface="Arial" panose="020B0604020202020204" pitchFamily="34" charset="0"/>
+              <a:buChar char="•"/>
+            </a:pPr>
+            <a:endParaRPr lang="fr-FR" dirty="0" smtClean="0"/>
+          </a:p>
+        </p:txBody>
+      </p:sp>
       <p:pic>
         <p:nvPicPr>
-          <p:cNvPr id="14" name="Picture 13"/>
+          <p:cNvPr id="7" name="Picture 6"/>
           <p:cNvPicPr>
             <a:picLocks noChangeAspect="1"/>
           </p:cNvPicPr>
@@ -4243,109 +4775,19 @@
               </a:ext>
             </a:extLst>
           </a:blip>
-          <a:srcRect t="9370" b="10944"/>
+          <a:srcRect l="8724" r="7144"/>
           <a:stretch/>
         </p:blipFill>
         <p:spPr>
           <a:xfrm>
-            <a:off x="6452613" y="3930968"/>
-            <a:ext cx="4327714" cy="2581837"/>
+            <a:off x="8140512" y="2036427"/>
+            <a:ext cx="4038600" cy="3593763"/>
           </a:xfrm>
           <a:prstGeom prst="rect">
             <a:avLst/>
           </a:prstGeom>
         </p:spPr>
       </p:pic>
-      <p:sp>
-        <p:nvSpPr>
-          <p:cNvPr id="15" name="TextBox 14"/>
-          <p:cNvSpPr txBox="1"/>
-          <p:nvPr/>
-        </p:nvSpPr>
-        <p:spPr>
-          <a:xfrm>
-            <a:off x="10830708" y="2455383"/>
-            <a:ext cx="523092" cy="369332"/>
-          </a:xfrm>
-          <a:prstGeom prst="rect">
-            <a:avLst/>
-          </a:prstGeom>
-          <a:noFill/>
-        </p:spPr>
-        <p:txBody>
-          <a:bodyPr wrap="none" rtlCol="0">
-            <a:spAutoFit/>
-          </a:bodyPr>
-          <a:lstStyle/>
-          <a:p>
-            <a:r>
-              <a:rPr lang="fr-FR" dirty="0" smtClean="0"/>
-              <a:t>C(f)</a:t>
-            </a:r>
-            <a:endParaRPr lang="fr-FR" dirty="0"/>
-          </a:p>
-        </p:txBody>
-      </p:sp>
-      <p:sp>
-        <p:nvSpPr>
-          <p:cNvPr id="16" name="TextBox 15"/>
-          <p:cNvSpPr txBox="1"/>
-          <p:nvPr/>
-        </p:nvSpPr>
-        <p:spPr>
-          <a:xfrm>
-            <a:off x="10945419" y="5037220"/>
-            <a:ext cx="293670" cy="369332"/>
-          </a:xfrm>
-          <a:prstGeom prst="rect">
-            <a:avLst/>
-          </a:prstGeom>
-          <a:noFill/>
-        </p:spPr>
-        <p:txBody>
-          <a:bodyPr wrap="none" rtlCol="0">
-            <a:spAutoFit/>
-          </a:bodyPr>
-          <a:lstStyle/>
-          <a:p>
-            <a:r>
-              <a:rPr lang="fr-FR" dirty="0" smtClean="0"/>
-              <a:t>g</a:t>
-            </a:r>
-            <a:endParaRPr lang="fr-FR" dirty="0"/>
-          </a:p>
-        </p:txBody>
-      </p:sp>
-      <p:sp>
-        <p:nvSpPr>
-          <p:cNvPr id="17" name="TextBox 16"/>
-          <p:cNvSpPr txBox="1"/>
-          <p:nvPr/>
-        </p:nvSpPr>
-        <p:spPr>
-          <a:xfrm>
-            <a:off x="315108" y="3506022"/>
-            <a:ext cx="255198" cy="369332"/>
-          </a:xfrm>
-          <a:prstGeom prst="rect">
-            <a:avLst/>
-          </a:prstGeom>
-          <a:noFill/>
-        </p:spPr>
-        <p:txBody>
-          <a:bodyPr wrap="none" rtlCol="0">
-            <a:spAutoFit/>
-          </a:bodyPr>
-          <a:lstStyle/>
-          <a:p>
-            <a:r>
-              <a:rPr lang="fr-FR" dirty="0" smtClean="0"/>
-              <a:t>f</a:t>
-            </a:r>
-            <a:endParaRPr lang="fr-FR" dirty="0"/>
-          </a:p>
-        </p:txBody>
-      </p:sp>
     </p:spTree>
     <p:extLst>
       <p:ext uri="{BB962C8B-B14F-4D97-AF65-F5344CB8AC3E}">
@@ -4359,9 +4801,88 @@
   <p:timing>
     <p:tnLst>
       <p:par>
-        <p:cTn id="1" dur="indefinite" restart="never" nodeType="tmRoot"/>
+        <p:cTn id="1" dur="indefinite" restart="never" nodeType="tmRoot">
+          <p:childTnLst>
+            <p:seq concurrent="1" nextAc="seek">
+              <p:cTn id="2" dur="indefinite" nodeType="mainSeq">
+                <p:childTnLst>
+                  <p:par>
+                    <p:cTn id="3" fill="hold">
+                      <p:stCondLst>
+                        <p:cond delay="indefinite"/>
+                      </p:stCondLst>
+                      <p:childTnLst>
+                        <p:par>
+                          <p:cTn id="4" fill="hold">
+                            <p:stCondLst>
+                              <p:cond delay="0"/>
+                            </p:stCondLst>
+                            <p:childTnLst>
+                              <p:par>
+                                <p:cTn id="5" presetID="10" presetClass="entr" presetSubtype="0" fill="hold" grpId="0" nodeType="clickEffect">
+                                  <p:stCondLst>
+                                    <p:cond delay="0"/>
+                                  </p:stCondLst>
+                                  <p:childTnLst>
+                                    <p:set>
+                                      <p:cBhvr>
+                                        <p:cTn id="6" dur="1" fill="hold">
+                                          <p:stCondLst>
+                                            <p:cond delay="0"/>
+                                          </p:stCondLst>
+                                        </p:cTn>
+                                        <p:tgtEl>
+                                          <p:spTgt spid="6"/>
+                                        </p:tgtEl>
+                                        <p:attrNameLst>
+                                          <p:attrName>style.visibility</p:attrName>
+                                        </p:attrNameLst>
+                                      </p:cBhvr>
+                                      <p:to>
+                                        <p:strVal val="visible"/>
+                                      </p:to>
+                                    </p:set>
+                                    <p:animEffect transition="in" filter="fade">
+                                      <p:cBhvr>
+                                        <p:cTn id="7" dur="500"/>
+                                        <p:tgtEl>
+                                          <p:spTgt spid="6"/>
+                                        </p:tgtEl>
+                                      </p:cBhvr>
+                                    </p:animEffect>
+                                  </p:childTnLst>
+                                </p:cTn>
+                              </p:par>
+                            </p:childTnLst>
+                          </p:cTn>
+                        </p:par>
+                      </p:childTnLst>
+                    </p:cTn>
+                  </p:par>
+                </p:childTnLst>
+              </p:cTn>
+              <p:prevCondLst>
+                <p:cond evt="onPrev" delay="0">
+                  <p:tgtEl>
+                    <p:sldTgt/>
+                  </p:tgtEl>
+                </p:cond>
+              </p:prevCondLst>
+              <p:nextCondLst>
+                <p:cond evt="onNext" delay="0">
+                  <p:tgtEl>
+                    <p:sldTgt/>
+                  </p:tgtEl>
+                </p:cond>
+              </p:nextCondLst>
+            </p:seq>
+          </p:childTnLst>
+        </p:cTn>
       </p:par>
     </p:tnLst>
+    <p:bldLst>
+      <p:bldP spid="6" grpId="0"/>
+    </p:bldLst>
   </p:timing>
 </p:sld>
 </file>
@@ -4572,8 +5093,8 @@
           </a:p>
         </p:txBody>
       </p:sp>
-      <mc:AlternateContent xmlns:mc="http://schemas.openxmlformats.org/markup-compatibility/2006">
-        <mc:Choice xmlns:a14="http://schemas.microsoft.com/office/drawing/2010/main" Requires="a14">
+      <mc:AlternateContent xmlns:mc="http://schemas.openxmlformats.org/markup-compatibility/2006" xmlns:a14="http://schemas.microsoft.com/office/drawing/2010/main">
+        <mc:Choice Requires="a14">
           <p:sp>
             <p:nvSpPr>
               <p:cNvPr id="3" name="Content Placeholder 2"/>
@@ -4823,7 +5344,6 @@
                   <a:rPr lang="fr-FR" dirty="0" smtClean="0"/>
                   <a:t> </a:t>
                 </a:r>
-                <a:endParaRPr lang="fr-FR" dirty="0" smtClean="0"/>
               </a:p>
               <a:p>
                 <a:r>
@@ -4885,19 +5405,7 @@
                           <a:rPr lang="fr-FR" i="1">
                             <a:latin typeface="Cambria Math" panose="02040503050406030204" pitchFamily="18" charset="0"/>
                           </a:rPr>
-                          <m:t>3</m:t>
-                        </m:r>
-                        <m:r>
-                          <a:rPr lang="fr-FR" i="1">
-                            <a:latin typeface="Cambria Math" panose="02040503050406030204" pitchFamily="18" charset="0"/>
-                          </a:rPr>
-                          <m:t>→</m:t>
-                        </m:r>
-                        <m:r>
-                          <a:rPr lang="fr-FR" i="1">
-                            <a:latin typeface="Cambria Math" panose="02040503050406030204" pitchFamily="18" charset="0"/>
-                          </a:rPr>
-                          <m:t>1</m:t>
+                          <m:t>3→1</m:t>
                         </m:r>
                       </m:sub>
                     </m:sSub>
@@ -5113,7 +5621,7 @@
             </p:txBody>
           </p:sp>
         </mc:Choice>
-        <mc:Fallback>
+        <mc:Fallback xmlns="">
           <p:sp>
             <p:nvSpPr>
               <p:cNvPr id="3" name="Content Placeholder 2"/>
@@ -6537,32 +7045,9 @@
           <a:chExt cx="0" cy="0"/>
         </a:xfrm>
       </p:grpSpPr>
-      <p:sp>
-        <p:nvSpPr>
-          <p:cNvPr id="2" name="Title 1"/>
-          <p:cNvSpPr>
-            <a:spLocks noGrp="1"/>
-          </p:cNvSpPr>
-          <p:nvPr>
-            <p:ph type="title"/>
-          </p:nvPr>
-        </p:nvSpPr>
-        <p:spPr/>
-        <p:txBody>
-          <a:bodyPr/>
-          <a:lstStyle/>
-          <a:p>
-            <a:r>
-              <a:rPr lang="fr-FR" dirty="0" smtClean="0"/>
-              <a:t>Théorie de la représentation fonctionnelle - Alex</a:t>
-            </a:r>
-            <a:endParaRPr lang="fr-FR" dirty="0"/>
-          </a:p>
-        </p:txBody>
-      </p:sp>
       <p:pic>
         <p:nvPicPr>
-          <p:cNvPr id="5" name="Picture 4"/>
+          <p:cNvPr id="3" name="Picture 2"/>
           <p:cNvPicPr>
             <a:picLocks noChangeAspect="1"/>
           </p:cNvPicPr>
@@ -6582,8 +7067,8 @@
         </p:blipFill>
         <p:spPr>
           <a:xfrm>
-            <a:off x="1281953" y="1690688"/>
-            <a:ext cx="3894269" cy="2915496"/>
+            <a:off x="1448713" y="1808418"/>
+            <a:ext cx="3308297" cy="2476800"/>
           </a:xfrm>
           <a:prstGeom prst="rect">
             <a:avLst/>
@@ -6592,7 +7077,7 @@
       </p:pic>
       <p:pic>
         <p:nvPicPr>
-          <p:cNvPr id="6" name="Picture 5"/>
+          <p:cNvPr id="8" name="Picture 7"/>
           <p:cNvPicPr>
             <a:picLocks noChangeAspect="1"/>
           </p:cNvPicPr>
@@ -6612,14 +7097,97 @@
         </p:blipFill>
         <p:spPr>
           <a:xfrm>
-            <a:off x="6096000" y="1690689"/>
-            <a:ext cx="3894268" cy="2915495"/>
+            <a:off x="6388985" y="1808418"/>
+            <a:ext cx="3308297" cy="2476800"/>
           </a:xfrm>
           <a:prstGeom prst="rect">
             <a:avLst/>
           </a:prstGeom>
         </p:spPr>
       </p:pic>
+      <p:pic>
+        <p:nvPicPr>
+          <p:cNvPr id="4" name="Picture 3"/>
+          <p:cNvPicPr>
+            <a:picLocks noChangeAspect="1"/>
+          </p:cNvPicPr>
+          <p:nvPr/>
+        </p:nvPicPr>
+        <p:blipFill>
+          <a:blip r:embed="rId4">
+            <a:extLst>
+              <a:ext uri="{28A0092B-C50C-407E-A947-70E740481C1C}">
+                <a14:useLocalDpi xmlns:a14="http://schemas.microsoft.com/office/drawing/2010/main" val="0"/>
+              </a:ext>
+            </a:extLst>
+          </a:blip>
+          <a:stretch>
+            <a:fillRect/>
+          </a:stretch>
+        </p:blipFill>
+        <p:spPr>
+          <a:xfrm>
+            <a:off x="1447962" y="1806941"/>
+            <a:ext cx="3309798" cy="2477924"/>
+          </a:xfrm>
+          <a:prstGeom prst="rect">
+            <a:avLst/>
+          </a:prstGeom>
+        </p:spPr>
+      </p:pic>
+      <p:pic>
+        <p:nvPicPr>
+          <p:cNvPr id="10" name="Picture 9"/>
+          <p:cNvPicPr>
+            <a:picLocks noChangeAspect="1"/>
+          </p:cNvPicPr>
+          <p:nvPr/>
+        </p:nvPicPr>
+        <p:blipFill>
+          <a:blip r:embed="rId5">
+            <a:extLst>
+              <a:ext uri="{28A0092B-C50C-407E-A947-70E740481C1C}">
+                <a14:useLocalDpi xmlns:a14="http://schemas.microsoft.com/office/drawing/2010/main" val="0"/>
+              </a:ext>
+            </a:extLst>
+          </a:blip>
+          <a:stretch>
+            <a:fillRect/>
+          </a:stretch>
+        </p:blipFill>
+        <p:spPr>
+          <a:xfrm>
+            <a:off x="6364940" y="1808065"/>
+            <a:ext cx="3308297" cy="2476800"/>
+          </a:xfrm>
+          <a:prstGeom prst="rect">
+            <a:avLst/>
+          </a:prstGeom>
+        </p:spPr>
+      </p:pic>
+      <p:sp>
+        <p:nvSpPr>
+          <p:cNvPr id="2" name="Title 1"/>
+          <p:cNvSpPr>
+            <a:spLocks noGrp="1"/>
+          </p:cNvSpPr>
+          <p:nvPr>
+            <p:ph type="title"/>
+          </p:nvPr>
+        </p:nvSpPr>
+        <p:spPr/>
+        <p:txBody>
+          <a:bodyPr/>
+          <a:lstStyle/>
+          <a:p>
+            <a:r>
+              <a:rPr lang="fr-FR" dirty="0" smtClean="0"/>
+              <a:t>Théorie de la représentation fonctionnelle - Alex</a:t>
+            </a:r>
+            <a:endParaRPr lang="fr-FR" dirty="0"/>
+          </a:p>
+        </p:txBody>
+      </p:sp>
       <p:sp>
         <p:nvSpPr>
           <p:cNvPr id="7" name="Right Arrow 6"/>
@@ -6845,7 +7413,7 @@
                 <a:avLst/>
               </a:prstGeom>
               <a:blipFill rotWithShape="0">
-                <a:blip r:embed="rId4"/>
+                <a:blip r:embed="rId6"/>
                 <a:stretch>
                   <a:fillRect l="-6989" t="-2222" r="-4301" b="-35556"/>
                 </a:stretch>
@@ -6956,7 +7524,7 @@
                 <a:avLst/>
               </a:prstGeom>
               <a:blipFill rotWithShape="0">
-                <a:blip r:embed="rId5"/>
+                <a:blip r:embed="rId7"/>
                 <a:stretch>
                   <a:fillRect l="-3743" r="-3209" b="-26667"/>
                 </a:stretch>
@@ -7143,7 +7711,7 @@
                 <a:avLst/>
               </a:prstGeom>
               <a:blipFill rotWithShape="0">
-                <a:blip r:embed="rId6"/>
+                <a:blip r:embed="rId8"/>
                 <a:stretch>
                   <a:fillRect l="-2266" t="-4444" r="-850" b="-35556"/>
                 </a:stretch>
@@ -7291,7 +7859,7 @@
                 <a:avLst/>
               </a:prstGeom>
               <a:blipFill rotWithShape="0">
-                <a:blip r:embed="rId7"/>
+                <a:blip r:embed="rId9"/>
                 <a:stretch>
                   <a:fillRect/>
                 </a:stretch>
@@ -7325,9 +7893,302 @@
   <p:timing>
     <p:tnLst>
       <p:par>
-        <p:cTn id="1" dur="indefinite" restart="never" nodeType="tmRoot"/>
+        <p:cTn id="1" dur="indefinite" restart="never" nodeType="tmRoot">
+          <p:childTnLst>
+            <p:seq concurrent="1" nextAc="seek">
+              <p:cTn id="2" dur="indefinite" nodeType="mainSeq">
+                <p:childTnLst>
+                  <p:par>
+                    <p:cTn id="3" fill="hold">
+                      <p:stCondLst>
+                        <p:cond delay="indefinite"/>
+                      </p:stCondLst>
+                      <p:childTnLst>
+                        <p:par>
+                          <p:cTn id="4" fill="hold">
+                            <p:stCondLst>
+                              <p:cond delay="0"/>
+                            </p:stCondLst>
+                            <p:childTnLst>
+                              <p:par>
+                                <p:cTn id="5" presetID="10" presetClass="entr" presetSubtype="0" fill="hold" grpId="0" nodeType="clickEffect">
+                                  <p:stCondLst>
+                                    <p:cond delay="0"/>
+                                  </p:stCondLst>
+                                  <p:childTnLst>
+                                    <p:set>
+                                      <p:cBhvr>
+                                        <p:cTn id="6" dur="1" fill="hold">
+                                          <p:stCondLst>
+                                            <p:cond delay="0"/>
+                                          </p:stCondLst>
+                                        </p:cTn>
+                                        <p:tgtEl>
+                                          <p:spTgt spid="15"/>
+                                        </p:tgtEl>
+                                        <p:attrNameLst>
+                                          <p:attrName>style.visibility</p:attrName>
+                                        </p:attrNameLst>
+                                      </p:cBhvr>
+                                      <p:to>
+                                        <p:strVal val="visible"/>
+                                      </p:to>
+                                    </p:set>
+                                    <p:animEffect transition="in" filter="fade">
+                                      <p:cBhvr>
+                                        <p:cTn id="7" dur="500"/>
+                                        <p:tgtEl>
+                                          <p:spTgt spid="15"/>
+                                        </p:tgtEl>
+                                      </p:cBhvr>
+                                    </p:animEffect>
+                                  </p:childTnLst>
+                                </p:cTn>
+                              </p:par>
+                              <p:par>
+                                <p:cTn id="8" presetID="10" presetClass="entr" presetSubtype="0" fill="hold" grpId="0" nodeType="withEffect">
+                                  <p:stCondLst>
+                                    <p:cond delay="0"/>
+                                  </p:stCondLst>
+                                  <p:childTnLst>
+                                    <p:set>
+                                      <p:cBhvr>
+                                        <p:cTn id="9" dur="1" fill="hold">
+                                          <p:stCondLst>
+                                            <p:cond delay="0"/>
+                                          </p:stCondLst>
+                                        </p:cTn>
+                                        <p:tgtEl>
+                                          <p:spTgt spid="19"/>
+                                        </p:tgtEl>
+                                        <p:attrNameLst>
+                                          <p:attrName>style.visibility</p:attrName>
+                                        </p:attrNameLst>
+                                      </p:cBhvr>
+                                      <p:to>
+                                        <p:strVal val="visible"/>
+                                      </p:to>
+                                    </p:set>
+                                    <p:animEffect transition="in" filter="fade">
+                                      <p:cBhvr>
+                                        <p:cTn id="10" dur="500"/>
+                                        <p:tgtEl>
+                                          <p:spTgt spid="19"/>
+                                        </p:tgtEl>
+                                      </p:cBhvr>
+                                    </p:animEffect>
+                                  </p:childTnLst>
+                                </p:cTn>
+                              </p:par>
+                              <p:par>
+                                <p:cTn id="11" presetID="10" presetClass="entr" presetSubtype="0" fill="hold" grpId="0" nodeType="withEffect">
+                                  <p:stCondLst>
+                                    <p:cond delay="0"/>
+                                  </p:stCondLst>
+                                  <p:childTnLst>
+                                    <p:set>
+                                      <p:cBhvr>
+                                        <p:cTn id="12" dur="1" fill="hold">
+                                          <p:stCondLst>
+                                            <p:cond delay="0"/>
+                                          </p:stCondLst>
+                                        </p:cTn>
+                                        <p:tgtEl>
+                                          <p:spTgt spid="18"/>
+                                        </p:tgtEl>
+                                        <p:attrNameLst>
+                                          <p:attrName>style.visibility</p:attrName>
+                                        </p:attrNameLst>
+                                      </p:cBhvr>
+                                      <p:to>
+                                        <p:strVal val="visible"/>
+                                      </p:to>
+                                    </p:set>
+                                    <p:animEffect transition="in" filter="fade">
+                                      <p:cBhvr>
+                                        <p:cTn id="13" dur="500"/>
+                                        <p:tgtEl>
+                                          <p:spTgt spid="18"/>
+                                        </p:tgtEl>
+                                      </p:cBhvr>
+                                    </p:animEffect>
+                                  </p:childTnLst>
+                                </p:cTn>
+                              </p:par>
+                              <p:par>
+                                <p:cTn id="14" presetID="10" presetClass="entr" presetSubtype="0" fill="hold" grpId="0" nodeType="withEffect">
+                                  <p:stCondLst>
+                                    <p:cond delay="0"/>
+                                  </p:stCondLst>
+                                  <p:childTnLst>
+                                    <p:set>
+                                      <p:cBhvr>
+                                        <p:cTn id="15" dur="1" fill="hold">
+                                          <p:stCondLst>
+                                            <p:cond delay="0"/>
+                                          </p:stCondLst>
+                                        </p:cTn>
+                                        <p:tgtEl>
+                                          <p:spTgt spid="17"/>
+                                        </p:tgtEl>
+                                        <p:attrNameLst>
+                                          <p:attrName>style.visibility</p:attrName>
+                                        </p:attrNameLst>
+                                      </p:cBhvr>
+                                      <p:to>
+                                        <p:strVal val="visible"/>
+                                      </p:to>
+                                    </p:set>
+                                    <p:animEffect transition="in" filter="fade">
+                                      <p:cBhvr>
+                                        <p:cTn id="16" dur="500"/>
+                                        <p:tgtEl>
+                                          <p:spTgt spid="17"/>
+                                        </p:tgtEl>
+                                      </p:cBhvr>
+                                    </p:animEffect>
+                                  </p:childTnLst>
+                                </p:cTn>
+                              </p:par>
+                              <p:par>
+                                <p:cTn id="17" presetID="10" presetClass="entr" presetSubtype="0" fill="hold" grpId="0" nodeType="withEffect">
+                                  <p:stCondLst>
+                                    <p:cond delay="0"/>
+                                  </p:stCondLst>
+                                  <p:childTnLst>
+                                    <p:set>
+                                      <p:cBhvr>
+                                        <p:cTn id="18" dur="1" fill="hold">
+                                          <p:stCondLst>
+                                            <p:cond delay="0"/>
+                                          </p:stCondLst>
+                                        </p:cTn>
+                                        <p:tgtEl>
+                                          <p:spTgt spid="16"/>
+                                        </p:tgtEl>
+                                        <p:attrNameLst>
+                                          <p:attrName>style.visibility</p:attrName>
+                                        </p:attrNameLst>
+                                      </p:cBhvr>
+                                      <p:to>
+                                        <p:strVal val="visible"/>
+                                      </p:to>
+                                    </p:set>
+                                    <p:animEffect transition="in" filter="fade">
+                                      <p:cBhvr>
+                                        <p:cTn id="19" dur="500"/>
+                                        <p:tgtEl>
+                                          <p:spTgt spid="16"/>
+                                        </p:tgtEl>
+                                      </p:cBhvr>
+                                    </p:animEffect>
+                                  </p:childTnLst>
+                                </p:cTn>
+                              </p:par>
+                              <p:par>
+                                <p:cTn id="20" presetID="10" presetClass="entr" presetSubtype="0" fill="hold" nodeType="withEffect">
+                                  <p:stCondLst>
+                                    <p:cond delay="0"/>
+                                  </p:stCondLst>
+                                  <p:childTnLst>
+                                    <p:set>
+                                      <p:cBhvr>
+                                        <p:cTn id="21" dur="1" fill="hold">
+                                          <p:stCondLst>
+                                            <p:cond delay="0"/>
+                                          </p:stCondLst>
+                                        </p:cTn>
+                                        <p:tgtEl>
+                                          <p:spTgt spid="4"/>
+                                        </p:tgtEl>
+                                        <p:attrNameLst>
+                                          <p:attrName>style.visibility</p:attrName>
+                                        </p:attrNameLst>
+                                      </p:cBhvr>
+                                      <p:to>
+                                        <p:strVal val="visible"/>
+                                      </p:to>
+                                    </p:set>
+                                    <p:animEffect transition="in" filter="fade">
+                                      <p:cBhvr>
+                                        <p:cTn id="22" dur="500"/>
+                                        <p:tgtEl>
+                                          <p:spTgt spid="4"/>
+                                        </p:tgtEl>
+                                      </p:cBhvr>
+                                    </p:animEffect>
+                                  </p:childTnLst>
+                                </p:cTn>
+                              </p:par>
+                              <p:par>
+                                <p:cTn id="23" presetID="10" presetClass="entr" presetSubtype="0" fill="hold" nodeType="withEffect">
+                                  <p:stCondLst>
+                                    <p:cond delay="0"/>
+                                  </p:stCondLst>
+                                  <p:childTnLst>
+                                    <p:set>
+                                      <p:cBhvr>
+                                        <p:cTn id="24" dur="1" fill="hold">
+                                          <p:stCondLst>
+                                            <p:cond delay="0"/>
+                                          </p:stCondLst>
+                                        </p:cTn>
+                                        <p:tgtEl>
+                                          <p:spTgt spid="10"/>
+                                        </p:tgtEl>
+                                        <p:attrNameLst>
+                                          <p:attrName>style.visibility</p:attrName>
+                                        </p:attrNameLst>
+                                      </p:cBhvr>
+                                      <p:to>
+                                        <p:strVal val="visible"/>
+                                      </p:to>
+                                    </p:set>
+                                    <p:animEffect transition="in" filter="fade">
+                                      <p:cBhvr>
+                                        <p:cTn id="25" dur="500"/>
+                                        <p:tgtEl>
+                                          <p:spTgt spid="10"/>
+                                        </p:tgtEl>
+                                      </p:cBhvr>
+                                    </p:animEffect>
+                                  </p:childTnLst>
+                                </p:cTn>
+                              </p:par>
+                            </p:childTnLst>
+                          </p:cTn>
+                        </p:par>
+                      </p:childTnLst>
+                    </p:cTn>
+                  </p:par>
+                </p:childTnLst>
+              </p:cTn>
+              <p:prevCondLst>
+                <p:cond evt="onPrev" delay="0">
+                  <p:tgtEl>
+                    <p:sldTgt/>
+                  </p:tgtEl>
+                </p:cond>
+              </p:prevCondLst>
+              <p:nextCondLst>
+                <p:cond evt="onNext" delay="0">
+                  <p:tgtEl>
+                    <p:sldTgt/>
+                  </p:tgtEl>
+                </p:cond>
+              </p:nextCondLst>
+            </p:seq>
+          </p:childTnLst>
+        </p:cTn>
       </p:par>
     </p:tnLst>
+    <p:bldLst>
+      <p:bldP spid="15" grpId="0"/>
+      <p:bldP spid="16" grpId="0"/>
+      <p:bldP spid="17" grpId="0"/>
+      <p:bldP spid="18" grpId="0" animBg="1"/>
+      <p:bldP spid="19" grpId="0"/>
+    </p:bldLst>
   </p:timing>
 </p:sld>
 </file>
@@ -9121,11 +9982,7 @@
             </a:r>
             <a:r>
               <a:rPr lang="fr-FR" dirty="0" smtClean="0"/>
-              <a:t> : s</a:t>
-            </a:r>
-            <a:r>
-              <a:rPr lang="fr-FR" dirty="0" smtClean="0"/>
-              <a:t>et of </a:t>
+              <a:t> : set of </a:t>
             </a:r>
             <a:r>
               <a:rPr lang="fr-FR" dirty="0" err="1" smtClean="0"/>
@@ -9288,7 +10145,6 @@
               <a:rPr lang="fr-FR" dirty="0" smtClean="0"/>
               <a:t>)</a:t>
             </a:r>
-            <a:endParaRPr lang="fr-FR" dirty="0" smtClean="0"/>
           </a:p>
           <a:p>
             <a:pPr lvl="1"/>
@@ -9300,8 +10156,8 @@
           </a:p>
         </p:txBody>
       </p:sp>
-      <mc:AlternateContent xmlns:mc="http://schemas.openxmlformats.org/markup-compatibility/2006">
-        <mc:Choice xmlns:a14="http://schemas.microsoft.com/office/drawing/2010/main" Requires="a14">
+      <mc:AlternateContent xmlns:mc="http://schemas.openxmlformats.org/markup-compatibility/2006" xmlns:a14="http://schemas.microsoft.com/office/drawing/2010/main">
+        <mc:Choice Requires="a14">
           <p:sp>
             <p:nvSpPr>
               <p:cNvPr id="4" name="TextBox 3"/>
@@ -9548,7 +10404,7 @@
             </p:txBody>
           </p:sp>
         </mc:Choice>
-        <mc:Fallback>
+        <mc:Fallback xmlns="">
           <p:sp>
             <p:nvSpPr>
               <p:cNvPr id="4" name="TextBox 3"/>

</xml_diff>